<commit_message>
Updated files for website
</commit_message>
<xml_diff>
--- a/stationary/email.pptx
+++ b/stationary/email.pptx
@@ -6,6 +6,7 @@
   </p:sldMasterIdLst>
   <p:sldIdLst>
     <p:sldId id="258" r:id="rId2"/>
+    <p:sldId id="259" r:id="rId3"/>
   </p:sldIdLst>
   <p:sldSz cx="13716000" cy="2514600"/>
   <p:notesSz cx="6858000" cy="9144000"/>
@@ -243,7 +244,7 @@
           <a:p>
             <a:fld id="{7907C48C-B3F3-8F41-AD79-6F11173CF5DF}" type="datetimeFigureOut">
               <a:rPr lang="en-US" smtClean="0"/>
-              <a:t>5/31/16</a:t>
+              <a:t>6/2/16</a:t>
             </a:fld>
             <a:endParaRPr lang="en-US"/>
           </a:p>
@@ -413,7 +414,7 @@
           <a:p>
             <a:fld id="{7907C48C-B3F3-8F41-AD79-6F11173CF5DF}" type="datetimeFigureOut">
               <a:rPr lang="en-US" smtClean="0"/>
-              <a:t>5/31/16</a:t>
+              <a:t>6/2/16</a:t>
             </a:fld>
             <a:endParaRPr lang="en-US"/>
           </a:p>
@@ -593,7 +594,7 @@
           <a:p>
             <a:fld id="{7907C48C-B3F3-8F41-AD79-6F11173CF5DF}" type="datetimeFigureOut">
               <a:rPr lang="en-US" smtClean="0"/>
-              <a:t>5/31/16</a:t>
+              <a:t>6/2/16</a:t>
             </a:fld>
             <a:endParaRPr lang="en-US"/>
           </a:p>
@@ -763,7 +764,7 @@
           <a:p>
             <a:fld id="{7907C48C-B3F3-8F41-AD79-6F11173CF5DF}" type="datetimeFigureOut">
               <a:rPr lang="en-US" smtClean="0"/>
-              <a:t>5/31/16</a:t>
+              <a:t>6/2/16</a:t>
             </a:fld>
             <a:endParaRPr lang="en-US"/>
           </a:p>
@@ -1009,7 +1010,7 @@
           <a:p>
             <a:fld id="{7907C48C-B3F3-8F41-AD79-6F11173CF5DF}" type="datetimeFigureOut">
               <a:rPr lang="en-US" smtClean="0"/>
-              <a:t>5/31/16</a:t>
+              <a:t>6/2/16</a:t>
             </a:fld>
             <a:endParaRPr lang="en-US"/>
           </a:p>
@@ -1241,7 +1242,7 @@
           <a:p>
             <a:fld id="{7907C48C-B3F3-8F41-AD79-6F11173CF5DF}" type="datetimeFigureOut">
               <a:rPr lang="en-US" smtClean="0"/>
-              <a:t>5/31/16</a:t>
+              <a:t>6/2/16</a:t>
             </a:fld>
             <a:endParaRPr lang="en-US"/>
           </a:p>
@@ -1608,7 +1609,7 @@
           <a:p>
             <a:fld id="{7907C48C-B3F3-8F41-AD79-6F11173CF5DF}" type="datetimeFigureOut">
               <a:rPr lang="en-US" smtClean="0"/>
-              <a:t>5/31/16</a:t>
+              <a:t>6/2/16</a:t>
             </a:fld>
             <a:endParaRPr lang="en-US"/>
           </a:p>
@@ -1726,7 +1727,7 @@
           <a:p>
             <a:fld id="{7907C48C-B3F3-8F41-AD79-6F11173CF5DF}" type="datetimeFigureOut">
               <a:rPr lang="en-US" smtClean="0"/>
-              <a:t>5/31/16</a:t>
+              <a:t>6/2/16</a:t>
             </a:fld>
             <a:endParaRPr lang="en-US"/>
           </a:p>
@@ -1821,7 +1822,7 @@
           <a:p>
             <a:fld id="{7907C48C-B3F3-8F41-AD79-6F11173CF5DF}" type="datetimeFigureOut">
               <a:rPr lang="en-US" smtClean="0"/>
-              <a:t>5/31/16</a:t>
+              <a:t>6/2/16</a:t>
             </a:fld>
             <a:endParaRPr lang="en-US"/>
           </a:p>
@@ -2098,7 +2099,7 @@
           <a:p>
             <a:fld id="{7907C48C-B3F3-8F41-AD79-6F11173CF5DF}" type="datetimeFigureOut">
               <a:rPr lang="en-US" smtClean="0"/>
-              <a:t>5/31/16</a:t>
+              <a:t>6/2/16</a:t>
             </a:fld>
             <a:endParaRPr lang="en-US"/>
           </a:p>
@@ -2355,7 +2356,7 @@
           <a:p>
             <a:fld id="{7907C48C-B3F3-8F41-AD79-6F11173CF5DF}" type="datetimeFigureOut">
               <a:rPr lang="en-US" smtClean="0"/>
-              <a:t>5/31/16</a:t>
+              <a:t>6/2/16</a:t>
             </a:fld>
             <a:endParaRPr lang="en-US"/>
           </a:p>
@@ -2568,7 +2569,7 @@
           <a:p>
             <a:fld id="{7907C48C-B3F3-8F41-AD79-6F11173CF5DF}" type="datetimeFigureOut">
               <a:rPr lang="en-US" smtClean="0"/>
-              <a:t>5/31/16</a:t>
+              <a:t>6/2/16</a:t>
             </a:fld>
             <a:endParaRPr lang="en-US"/>
           </a:p>
@@ -3151,6 +3152,201 @@
 </p:sld>
 </file>
 
+<file path=ppt/slides/slide2.xml><?xml version="1.0" encoding="utf-8"?>
+<p:sld xmlns:a="http://schemas.openxmlformats.org/drawingml/2006/main" xmlns:r="http://schemas.openxmlformats.org/officeDocument/2006/relationships" xmlns:p="http://schemas.openxmlformats.org/presentationml/2006/main">
+  <p:cSld>
+    <p:spTree>
+      <p:nvGrpSpPr>
+        <p:cNvPr id="1" name=""/>
+        <p:cNvGrpSpPr/>
+        <p:nvPr/>
+      </p:nvGrpSpPr>
+      <p:grpSpPr>
+        <a:xfrm>
+          <a:off x="0" y="0"/>
+          <a:ext cx="0" cy="0"/>
+          <a:chOff x="0" y="0"/>
+          <a:chExt cx="0" cy="0"/>
+        </a:xfrm>
+      </p:grpSpPr>
+      <p:pic>
+        <p:nvPicPr>
+          <p:cNvPr id="7" name="Picture 6"/>
+          <p:cNvPicPr>
+            <a:picLocks noChangeAspect="1"/>
+          </p:cNvPicPr>
+          <p:nvPr/>
+        </p:nvPicPr>
+        <p:blipFill rotWithShape="1">
+          <a:blip r:embed="rId2">
+            <a:extLst>
+              <a:ext uri="{28A0092B-C50C-407E-A947-70E740481C1C}">
+                <a14:useLocalDpi xmlns:a14="http://schemas.microsoft.com/office/drawing/2010/main" val="0"/>
+              </a:ext>
+            </a:extLst>
+          </a:blip>
+          <a:srcRect t="995" b="59075"/>
+          <a:stretch/>
+        </p:blipFill>
+        <p:spPr>
+          <a:xfrm>
+            <a:off x="0" y="0"/>
+            <a:ext cx="13716000" cy="2514600"/>
+          </a:xfrm>
+          <a:prstGeom prst="rect">
+            <a:avLst/>
+          </a:prstGeom>
+        </p:spPr>
+      </p:pic>
+      <p:sp>
+        <p:nvSpPr>
+          <p:cNvPr id="8" name="Rectangle 7"/>
+          <p:cNvSpPr/>
+          <p:nvPr/>
+        </p:nvSpPr>
+        <p:spPr>
+          <a:xfrm>
+            <a:off x="0" y="0"/>
+            <a:ext cx="13716000" cy="2514600"/>
+          </a:xfrm>
+          <a:prstGeom prst="rect">
+            <a:avLst/>
+          </a:prstGeom>
+          <a:solidFill>
+            <a:schemeClr val="tx1">
+              <a:alpha val="60000"/>
+            </a:schemeClr>
+          </a:solidFill>
+          <a:ln>
+            <a:noFill/>
+          </a:ln>
+        </p:spPr>
+        <p:style>
+          <a:lnRef idx="2">
+            <a:schemeClr val="accent1">
+              <a:shade val="50000"/>
+            </a:schemeClr>
+          </a:lnRef>
+          <a:fillRef idx="1">
+            <a:schemeClr val="accent1"/>
+          </a:fillRef>
+          <a:effectRef idx="0">
+            <a:schemeClr val="accent1"/>
+          </a:effectRef>
+          <a:fontRef idx="minor">
+            <a:schemeClr val="lt1"/>
+          </a:fontRef>
+        </p:style>
+        <p:txBody>
+          <a:bodyPr rtlCol="0" anchor="ctr"/>
+          <a:lstStyle/>
+          <a:p>
+            <a:pPr algn="ctr"/>
+            <a:endParaRPr lang="en-US"/>
+          </a:p>
+        </p:txBody>
+      </p:sp>
+      <p:sp>
+        <p:nvSpPr>
+          <p:cNvPr id="9" name="TextBox 8"/>
+          <p:cNvSpPr txBox="1"/>
+          <p:nvPr/>
+        </p:nvSpPr>
+        <p:spPr>
+          <a:xfrm>
+            <a:off x="0" y="609788"/>
+            <a:ext cx="7336945" cy="923330"/>
+          </a:xfrm>
+          <a:prstGeom prst="rect">
+            <a:avLst/>
+          </a:prstGeom>
+          <a:noFill/>
+        </p:spPr>
+        <p:txBody>
+          <a:bodyPr wrap="none" lIns="1207008" tIns="0" rIns="0" bIns="0" rtlCol="0">
+            <a:spAutoFit/>
+          </a:bodyPr>
+          <a:lstStyle/>
+          <a:p>
+            <a:r>
+              <a:rPr lang="en-US" sz="6000" b="1" dirty="0" smtClean="0">
+                <a:solidFill>
+                  <a:schemeClr val="bg1"/>
+                </a:solidFill>
+                <a:latin typeface="Roboto" charset="0"/>
+                <a:ea typeface="Roboto" charset="0"/>
+                <a:cs typeface="Roboto" charset="0"/>
+              </a:rPr>
+              <a:t>Delta Delta Sigma</a:t>
+            </a:r>
+            <a:endParaRPr lang="en-US" sz="6000" b="1" dirty="0">
+              <a:solidFill>
+                <a:schemeClr val="bg1"/>
+              </a:solidFill>
+              <a:latin typeface="Roboto" charset="0"/>
+              <a:ea typeface="Roboto" charset="0"/>
+              <a:cs typeface="Roboto" charset="0"/>
+            </a:endParaRPr>
+          </a:p>
+        </p:txBody>
+      </p:sp>
+      <p:sp>
+        <p:nvSpPr>
+          <p:cNvPr id="10" name="TextBox 9"/>
+          <p:cNvSpPr txBox="1"/>
+          <p:nvPr/>
+        </p:nvSpPr>
+        <p:spPr>
+          <a:xfrm>
+            <a:off x="0" y="1623354"/>
+            <a:ext cx="7452361" cy="276999"/>
+          </a:xfrm>
+          <a:prstGeom prst="rect">
+            <a:avLst/>
+          </a:prstGeom>
+          <a:noFill/>
+        </p:spPr>
+        <p:txBody>
+          <a:bodyPr wrap="none" lIns="1207008" tIns="0" rIns="0" bIns="0" rtlCol="0">
+            <a:spAutoFit/>
+          </a:bodyPr>
+          <a:lstStyle/>
+          <a:p>
+            <a:r>
+              <a:rPr lang="en-US" dirty="0" smtClean="0">
+                <a:solidFill>
+                  <a:schemeClr val="bg1"/>
+                </a:solidFill>
+                <a:latin typeface="Roboto" charset="0"/>
+                <a:ea typeface="Roboto" charset="0"/>
+                <a:cs typeface="Roboto" charset="0"/>
+              </a:rPr>
+              <a:t>THE UNIVERSITY OF WASHINGTON’S PRE-DENTAL SOCIETY</a:t>
+            </a:r>
+            <a:endParaRPr lang="en-US" dirty="0">
+              <a:solidFill>
+                <a:schemeClr val="bg1"/>
+              </a:solidFill>
+              <a:latin typeface="Roboto" charset="0"/>
+              <a:ea typeface="Roboto" charset="0"/>
+              <a:cs typeface="Roboto" charset="0"/>
+            </a:endParaRPr>
+          </a:p>
+        </p:txBody>
+      </p:sp>
+    </p:spTree>
+    <p:extLst>
+      <p:ext uri="{BB962C8B-B14F-4D97-AF65-F5344CB8AC3E}">
+        <p14:creationId xmlns:p14="http://schemas.microsoft.com/office/powerpoint/2010/main" val="1072917566"/>
+      </p:ext>
+    </p:extLst>
+  </p:cSld>
+  <p:clrMapOvr>
+    <a:masterClrMapping/>
+  </p:clrMapOvr>
+</p:sld>
+</file>
+
 <file path=ppt/theme/theme1.xml><?xml version="1.0" encoding="utf-8"?>
 <a:theme xmlns:a="http://schemas.openxmlformats.org/drawingml/2006/main" name="Office Theme">
   <a:themeElements>

</xml_diff>